<commit_message>
update database.py, add html
</commit_message>
<xml_diff>
--- a/....etc/DB project_조예진.pptx
+++ b/....etc/DB project_조예진.pptx
@@ -28,8 +28,10 @@
     <p:sldId id="290" r:id="rId22"/>
     <p:sldId id="293" r:id="rId23"/>
     <p:sldId id="291" r:id="rId24"/>
-    <p:sldId id="292" r:id="rId25"/>
-    <p:sldId id="285" r:id="rId26"/>
+    <p:sldId id="294" r:id="rId25"/>
+    <p:sldId id="295" r:id="rId26"/>
+    <p:sldId id="292" r:id="rId27"/>
+    <p:sldId id="285" r:id="rId28"/>
   </p:sldIdLst>
   <p:sldSz cx="12192000" cy="6858000"/>
   <p:notesSz cx="6858000" cy="9144000"/>
@@ -295,7 +297,7 @@
           <a:p>
             <a:fld id="{54C2E80D-4586-4167-8AE4-64E7165EAD2F}" type="datetimeFigureOut">
               <a:rPr lang="ko-KR" altLang="en-US" smtClean="0"/>
-              <a:t>2023-06-11</a:t>
+              <a:t>2023-06-14</a:t>
             </a:fld>
             <a:endParaRPr lang="ko-KR" altLang="en-US"/>
           </a:p>
@@ -493,7 +495,7 @@
           <a:p>
             <a:fld id="{54C2E80D-4586-4167-8AE4-64E7165EAD2F}" type="datetimeFigureOut">
               <a:rPr lang="ko-KR" altLang="en-US" smtClean="0"/>
-              <a:t>2023-06-11</a:t>
+              <a:t>2023-06-14</a:t>
             </a:fld>
             <a:endParaRPr lang="ko-KR" altLang="en-US"/>
           </a:p>
@@ -701,7 +703,7 @@
           <a:p>
             <a:fld id="{54C2E80D-4586-4167-8AE4-64E7165EAD2F}" type="datetimeFigureOut">
               <a:rPr lang="ko-KR" altLang="en-US" smtClean="0"/>
-              <a:t>2023-06-11</a:t>
+              <a:t>2023-06-14</a:t>
             </a:fld>
             <a:endParaRPr lang="ko-KR" altLang="en-US"/>
           </a:p>
@@ -899,7 +901,7 @@
           <a:p>
             <a:fld id="{54C2E80D-4586-4167-8AE4-64E7165EAD2F}" type="datetimeFigureOut">
               <a:rPr lang="ko-KR" altLang="en-US" smtClean="0"/>
-              <a:t>2023-06-11</a:t>
+              <a:t>2023-06-14</a:t>
             </a:fld>
             <a:endParaRPr lang="ko-KR" altLang="en-US"/>
           </a:p>
@@ -1174,7 +1176,7 @@
           <a:p>
             <a:fld id="{54C2E80D-4586-4167-8AE4-64E7165EAD2F}" type="datetimeFigureOut">
               <a:rPr lang="ko-KR" altLang="en-US" smtClean="0"/>
-              <a:t>2023-06-11</a:t>
+              <a:t>2023-06-14</a:t>
             </a:fld>
             <a:endParaRPr lang="ko-KR" altLang="en-US"/>
           </a:p>
@@ -1439,7 +1441,7 @@
           <a:p>
             <a:fld id="{54C2E80D-4586-4167-8AE4-64E7165EAD2F}" type="datetimeFigureOut">
               <a:rPr lang="ko-KR" altLang="en-US" smtClean="0"/>
-              <a:t>2023-06-11</a:t>
+              <a:t>2023-06-14</a:t>
             </a:fld>
             <a:endParaRPr lang="ko-KR" altLang="en-US"/>
           </a:p>
@@ -1851,7 +1853,7 @@
           <a:p>
             <a:fld id="{54C2E80D-4586-4167-8AE4-64E7165EAD2F}" type="datetimeFigureOut">
               <a:rPr lang="ko-KR" altLang="en-US" smtClean="0"/>
-              <a:t>2023-06-11</a:t>
+              <a:t>2023-06-14</a:t>
             </a:fld>
             <a:endParaRPr lang="ko-KR" altLang="en-US"/>
           </a:p>
@@ -1992,7 +1994,7 @@
           <a:p>
             <a:fld id="{54C2E80D-4586-4167-8AE4-64E7165EAD2F}" type="datetimeFigureOut">
               <a:rPr lang="ko-KR" altLang="en-US" smtClean="0"/>
-              <a:t>2023-06-11</a:t>
+              <a:t>2023-06-14</a:t>
             </a:fld>
             <a:endParaRPr lang="ko-KR" altLang="en-US"/>
           </a:p>
@@ -2105,7 +2107,7 @@
           <a:p>
             <a:fld id="{54C2E80D-4586-4167-8AE4-64E7165EAD2F}" type="datetimeFigureOut">
               <a:rPr lang="ko-KR" altLang="en-US" smtClean="0"/>
-              <a:t>2023-06-11</a:t>
+              <a:t>2023-06-14</a:t>
             </a:fld>
             <a:endParaRPr lang="ko-KR" altLang="en-US"/>
           </a:p>
@@ -2416,7 +2418,7 @@
           <a:p>
             <a:fld id="{54C2E80D-4586-4167-8AE4-64E7165EAD2F}" type="datetimeFigureOut">
               <a:rPr lang="ko-KR" altLang="en-US" smtClean="0"/>
-              <a:t>2023-06-11</a:t>
+              <a:t>2023-06-14</a:t>
             </a:fld>
             <a:endParaRPr lang="ko-KR" altLang="en-US"/>
           </a:p>
@@ -2704,7 +2706,7 @@
           <a:p>
             <a:fld id="{54C2E80D-4586-4167-8AE4-64E7165EAD2F}" type="datetimeFigureOut">
               <a:rPr lang="ko-KR" altLang="en-US" smtClean="0"/>
-              <a:t>2023-06-11</a:t>
+              <a:t>2023-06-14</a:t>
             </a:fld>
             <a:endParaRPr lang="ko-KR" altLang="en-US"/>
           </a:p>
@@ -2945,7 +2947,7 @@
           <a:p>
             <a:fld id="{54C2E80D-4586-4167-8AE4-64E7165EAD2F}" type="datetimeFigureOut">
               <a:rPr lang="ko-KR" altLang="en-US" smtClean="0"/>
-              <a:t>2023-06-11</a:t>
+              <a:t>2023-06-14</a:t>
             </a:fld>
             <a:endParaRPr lang="ko-KR" altLang="en-US"/>
           </a:p>
@@ -3508,8 +3510,16 @@
           </a:p>
           <a:p>
             <a:r>
+              <a:rPr lang="en-US" altLang="ko-KR" sz="1600" b="1" dirty="0"/>
+              <a:t>(</a:t>
+            </a:r>
+            <a:r>
+              <a:rPr lang="ko-KR" altLang="en-US" sz="1600" b="1" dirty="0"/>
+              <a:t>개발기간</a:t>
+            </a:r>
+            <a:r>
               <a:rPr lang="en-US" altLang="ko-KR" sz="1600" b="1"/>
-              <a:t>(0608 - )</a:t>
+              <a:t>: 0613 - 0615)</a:t>
             </a:r>
             <a:r>
               <a:rPr lang="ko-KR" altLang="en-US" sz="1600" b="1"/>
@@ -3916,7 +3926,29 @@
                 <a:ea typeface="맑은 고딕" panose="020B0503020000020004" pitchFamily="50" charset="-127"/>
                 <a:cs typeface="Times New Roman" panose="02020603050405020304" pitchFamily="18" charset="0"/>
               </a:rPr>
-              <a:t>프로그램 코드 설명</a:t>
+              <a:t>프로그램 </a:t>
+            </a:r>
+            <a:r>
+              <a:rPr lang="en-US" altLang="ko-KR" sz="2000" b="1" kern="100" dirty="0">
+                <a:solidFill>
+                  <a:schemeClr val="bg2"/>
+                </a:solidFill>
+                <a:latin typeface="맑은 고딕" panose="020B0503020000020004" pitchFamily="50" charset="-127"/>
+                <a:ea typeface="맑은 고딕" panose="020B0503020000020004" pitchFamily="50" charset="-127"/>
+                <a:cs typeface="Times New Roman" panose="02020603050405020304" pitchFamily="18" charset="0"/>
+              </a:rPr>
+              <a:t>UI/</a:t>
+            </a:r>
+            <a:r>
+              <a:rPr lang="ko-KR" altLang="en-US" sz="2000" b="1" kern="100" dirty="0">
+                <a:solidFill>
+                  <a:schemeClr val="bg2"/>
+                </a:solidFill>
+                <a:latin typeface="맑은 고딕" panose="020B0503020000020004" pitchFamily="50" charset="-127"/>
+                <a:ea typeface="맑은 고딕" panose="020B0503020000020004" pitchFamily="50" charset="-127"/>
+                <a:cs typeface="Times New Roman" panose="02020603050405020304" pitchFamily="18" charset="0"/>
+              </a:rPr>
+              <a:t>코드 설명</a:t>
             </a:r>
             <a:endParaRPr lang="en-US" altLang="ko-KR" sz="2000" b="1" kern="100" dirty="0">
               <a:solidFill>
@@ -11040,7 +11072,29 @@
                 <a:ea typeface="맑은 고딕" panose="020B0503020000020004" pitchFamily="50" charset="-127"/>
                 <a:cs typeface="Times New Roman" panose="02020603050405020304" pitchFamily="18" charset="0"/>
               </a:rPr>
-              <a:t>프로그램 코드 설명</a:t>
+              <a:t>프로그램 </a:t>
+            </a:r>
+            <a:r>
+              <a:rPr lang="en-US" altLang="ko-KR" sz="2000" b="1" kern="100" dirty="0">
+                <a:solidFill>
+                  <a:schemeClr val="bg2"/>
+                </a:solidFill>
+                <a:latin typeface="맑은 고딕" panose="020B0503020000020004" pitchFamily="50" charset="-127"/>
+                <a:ea typeface="맑은 고딕" panose="020B0503020000020004" pitchFamily="50" charset="-127"/>
+                <a:cs typeface="Times New Roman" panose="02020603050405020304" pitchFamily="18" charset="0"/>
+              </a:rPr>
+              <a:t>UI/</a:t>
+            </a:r>
+            <a:r>
+              <a:rPr lang="ko-KR" altLang="en-US" sz="2000" b="1" kern="100" dirty="0">
+                <a:solidFill>
+                  <a:schemeClr val="bg2"/>
+                </a:solidFill>
+                <a:latin typeface="맑은 고딕" panose="020B0503020000020004" pitchFamily="50" charset="-127"/>
+                <a:ea typeface="맑은 고딕" panose="020B0503020000020004" pitchFamily="50" charset="-127"/>
+                <a:cs typeface="Times New Roman" panose="02020603050405020304" pitchFamily="18" charset="0"/>
+              </a:rPr>
+              <a:t>코드 설명</a:t>
             </a:r>
             <a:endParaRPr lang="en-US" altLang="ko-KR" sz="2000" b="1" kern="100" dirty="0">
               <a:solidFill>
@@ -11922,8 +11976,8 @@
         </p:blipFill>
         <p:spPr>
           <a:xfrm>
-            <a:off x="838200" y="2489444"/>
-            <a:ext cx="2215393" cy="1859477"/>
+            <a:off x="720754" y="2489444"/>
+            <a:ext cx="2987701" cy="2507709"/>
           </a:xfrm>
           <a:prstGeom prst="rect">
             <a:avLst/>
@@ -12540,7 +12594,7 @@
         <p:spPr/>
         <p:txBody>
           <a:bodyPr>
-            <a:normAutofit lnSpcReduction="10000"/>
+            <a:normAutofit/>
           </a:bodyPr>
           <a:lstStyle/>
           <a:p>
@@ -12734,9 +12788,6 @@
             </a:pPr>
             <a:r>
               <a:rPr lang="ko-KR" altLang="en-US" sz="2000" b="1" kern="100" dirty="0">
-                <a:solidFill>
-                  <a:srgbClr val="C00000"/>
-                </a:solidFill>
                 <a:latin typeface="맑은 고딕" panose="020B0503020000020004" pitchFamily="50" charset="-127"/>
                 <a:ea typeface="맑은 고딕" panose="020B0503020000020004" pitchFamily="50" charset="-127"/>
                 <a:cs typeface="Times New Roman" panose="02020603050405020304" pitchFamily="18" charset="0"/>
@@ -12745,9 +12796,6 @@
             </a:r>
             <a:r>
               <a:rPr lang="en-US" altLang="ko-KR" sz="2000" b="1" kern="100" dirty="0">
-                <a:solidFill>
-                  <a:srgbClr val="C00000"/>
-                </a:solidFill>
                 <a:latin typeface="맑은 고딕" panose="020B0503020000020004" pitchFamily="50" charset="-127"/>
                 <a:ea typeface="맑은 고딕" panose="020B0503020000020004" pitchFamily="50" charset="-127"/>
                 <a:cs typeface="Times New Roman" panose="02020603050405020304" pitchFamily="18" charset="0"/>
@@ -12756,9 +12804,6 @@
             </a:r>
             <a:r>
               <a:rPr lang="ko-KR" altLang="en-US" sz="2000" b="1" kern="100" dirty="0">
-                <a:solidFill>
-                  <a:srgbClr val="C00000"/>
-                </a:solidFill>
                 <a:latin typeface="맑은 고딕" panose="020B0503020000020004" pitchFamily="50" charset="-127"/>
                 <a:ea typeface="맑은 고딕" panose="020B0503020000020004" pitchFamily="50" charset="-127"/>
                 <a:cs typeface="Times New Roman" panose="02020603050405020304" pitchFamily="18" charset="0"/>
@@ -12767,9 +12812,6 @@
             </a:r>
             <a:r>
               <a:rPr lang="en-US" altLang="ko-KR" sz="2000" b="1" kern="100" dirty="0">
-                <a:solidFill>
-                  <a:srgbClr val="C00000"/>
-                </a:solidFill>
                 <a:latin typeface="맑은 고딕" panose="020B0503020000020004" pitchFamily="50" charset="-127"/>
                 <a:ea typeface="맑은 고딕" panose="020B0503020000020004" pitchFamily="50" charset="-127"/>
                 <a:cs typeface="Times New Roman" panose="02020603050405020304" pitchFamily="18" charset="0"/>
@@ -12778,9 +12820,6 @@
             </a:r>
             <a:r>
               <a:rPr lang="ko-KR" altLang="en-US" sz="2000" b="1" kern="100" dirty="0">
-                <a:solidFill>
-                  <a:srgbClr val="C00000"/>
-                </a:solidFill>
                 <a:latin typeface="맑은 고딕" panose="020B0503020000020004" pitchFamily="50" charset="-127"/>
                 <a:ea typeface="맑은 고딕" panose="020B0503020000020004" pitchFamily="50" charset="-127"/>
                 <a:cs typeface="Times New Roman" panose="02020603050405020304" pitchFamily="18" charset="0"/>
@@ -12788,9 +12827,6 @@
               <a:t>설명</a:t>
             </a:r>
             <a:endParaRPr lang="en-US" altLang="ko-KR" sz="2000" b="1" kern="100" dirty="0">
-              <a:solidFill>
-                <a:srgbClr val="C00000"/>
-              </a:solidFill>
               <a:latin typeface="맑은 고딕" panose="020B0503020000020004" pitchFamily="50" charset="-127"/>
               <a:ea typeface="맑은 고딕" panose="020B0503020000020004" pitchFamily="50" charset="-127"/>
               <a:cs typeface="Times New Roman" panose="02020603050405020304" pitchFamily="18" charset="0"/>
@@ -12806,19 +12842,37 @@
             </a:pPr>
             <a:r>
               <a:rPr lang="ko-KR" altLang="en-US" sz="2000" b="1" kern="100" dirty="0">
-                <a:solidFill>
-                  <a:srgbClr val="C00000"/>
-                </a:solidFill>
-                <a:latin typeface="맑은 고딕" panose="020B0503020000020004" pitchFamily="50" charset="-127"/>
-                <a:ea typeface="맑은 고딕" panose="020B0503020000020004" pitchFamily="50" charset="-127"/>
-                <a:cs typeface="Times New Roman" panose="02020603050405020304" pitchFamily="18" charset="0"/>
-              </a:rPr>
-              <a:t>프로그램 코드 설명</a:t>
+                <a:latin typeface="맑은 고딕" panose="020B0503020000020004" pitchFamily="50" charset="-127"/>
+                <a:ea typeface="맑은 고딕" panose="020B0503020000020004" pitchFamily="50" charset="-127"/>
+                <a:cs typeface="Times New Roman" panose="02020603050405020304" pitchFamily="18" charset="0"/>
+              </a:rPr>
+              <a:t>프로그램 </a:t>
+            </a:r>
+            <a:r>
+              <a:rPr lang="en-US" altLang="ko-KR" sz="2000" b="1" kern="100">
+                <a:latin typeface="맑은 고딕" panose="020B0503020000020004" pitchFamily="50" charset="-127"/>
+                <a:ea typeface="맑은 고딕" panose="020B0503020000020004" pitchFamily="50" charset="-127"/>
+                <a:cs typeface="Times New Roman" panose="02020603050405020304" pitchFamily="18" charset="0"/>
+              </a:rPr>
+              <a:t>UI/</a:t>
+            </a:r>
+            <a:r>
+              <a:rPr lang="ko-KR" altLang="en-US" sz="2000" b="1" kern="100">
+                <a:latin typeface="맑은 고딕" panose="020B0503020000020004" pitchFamily="50" charset="-127"/>
+                <a:ea typeface="맑은 고딕" panose="020B0503020000020004" pitchFamily="50" charset="-127"/>
+                <a:cs typeface="Times New Roman" panose="02020603050405020304" pitchFamily="18" charset="0"/>
+              </a:rPr>
+              <a:t>코드 </a:t>
+            </a:r>
+            <a:r>
+              <a:rPr lang="ko-KR" altLang="en-US" sz="2000" b="1" kern="100" dirty="0">
+                <a:latin typeface="맑은 고딕" panose="020B0503020000020004" pitchFamily="50" charset="-127"/>
+                <a:ea typeface="맑은 고딕" panose="020B0503020000020004" pitchFamily="50" charset="-127"/>
+                <a:cs typeface="Times New Roman" panose="02020603050405020304" pitchFamily="18" charset="0"/>
+              </a:rPr>
+              <a:t>설명</a:t>
             </a:r>
             <a:endParaRPr lang="en-US" altLang="ko-KR" sz="2000" b="1" kern="100" dirty="0">
-              <a:solidFill>
-                <a:srgbClr val="C00000"/>
-              </a:solidFill>
               <a:latin typeface="맑은 고딕" panose="020B0503020000020004" pitchFamily="50" charset="-127"/>
               <a:ea typeface="맑은 고딕" panose="020B0503020000020004" pitchFamily="50" charset="-127"/>
               <a:cs typeface="Times New Roman" panose="02020603050405020304" pitchFamily="18" charset="0"/>
@@ -12834,9 +12888,6 @@
             </a:pPr>
             <a:r>
               <a:rPr lang="ko-KR" altLang="en-US" sz="2000" b="1" kern="100" dirty="0">
-                <a:solidFill>
-                  <a:srgbClr val="C00000"/>
-                </a:solidFill>
                 <a:latin typeface="맑은 고딕" panose="020B0503020000020004" pitchFamily="50" charset="-127"/>
                 <a:ea typeface="맑은 고딕" panose="020B0503020000020004" pitchFamily="50" charset="-127"/>
                 <a:cs typeface="Times New Roman" panose="02020603050405020304" pitchFamily="18" charset="0"/>
@@ -12844,54 +12895,10 @@
               <a:t>최종 결과물 설명</a:t>
             </a:r>
             <a:endParaRPr lang="en-US" altLang="ko-KR" sz="2000" b="1" kern="100" dirty="0">
-              <a:solidFill>
-                <a:srgbClr val="C00000"/>
-              </a:solidFill>
               <a:latin typeface="맑은 고딕" panose="020B0503020000020004" pitchFamily="50" charset="-127"/>
               <a:ea typeface="맑은 고딕" panose="020B0503020000020004" pitchFamily="50" charset="-127"/>
               <a:cs typeface="Times New Roman" panose="02020603050405020304" pitchFamily="18" charset="0"/>
             </a:endParaRPr>
-          </a:p>
-          <a:p>
-            <a:pPr marL="0" indent="0">
-              <a:lnSpc>
-                <a:spcPct val="150000"/>
-              </a:lnSpc>
-              <a:buNone/>
-            </a:pPr>
-            <a:r>
-              <a:rPr lang="en-US" altLang="ko-KR" sz="1400" b="1" kern="100" dirty="0">
-                <a:solidFill>
-                  <a:srgbClr val="C00000"/>
-                </a:solidFill>
-                <a:latin typeface="맑은 고딕" panose="020B0503020000020004" pitchFamily="50" charset="-127"/>
-                <a:ea typeface="맑은 고딕" panose="020B0503020000020004" pitchFamily="50" charset="-127"/>
-                <a:cs typeface="Times New Roman" panose="02020603050405020304" pitchFamily="18" charset="0"/>
-              </a:rPr>
-              <a:t>(* 5, 6, 7</a:t>
-            </a:r>
-            <a:r>
-              <a:rPr lang="ko-KR" altLang="en-US" sz="1400" b="1" kern="100" dirty="0">
-                <a:solidFill>
-                  <a:srgbClr val="C00000"/>
-                </a:solidFill>
-                <a:latin typeface="맑은 고딕" panose="020B0503020000020004" pitchFamily="50" charset="-127"/>
-                <a:ea typeface="맑은 고딕" panose="020B0503020000020004" pitchFamily="50" charset="-127"/>
-                <a:cs typeface="Times New Roman" panose="02020603050405020304" pitchFamily="18" charset="0"/>
-              </a:rPr>
-              <a:t>번은 현재 작업 진행중입니다</a:t>
-            </a:r>
-            <a:r>
-              <a:rPr lang="en-US" altLang="ko-KR" sz="1400" b="1" kern="100" dirty="0">
-                <a:solidFill>
-                  <a:srgbClr val="C00000"/>
-                </a:solidFill>
-                <a:latin typeface="맑은 고딕" panose="020B0503020000020004" pitchFamily="50" charset="-127"/>
-                <a:ea typeface="맑은 고딕" panose="020B0503020000020004" pitchFamily="50" charset="-127"/>
-                <a:cs typeface="Times New Roman" panose="02020603050405020304" pitchFamily="18" charset="0"/>
-              </a:rPr>
-              <a:t>.)</a:t>
-            </a:r>
           </a:p>
         </p:txBody>
       </p:sp>
@@ -13638,7 +13645,29 @@
                 <a:ea typeface="맑은 고딕" panose="020B0503020000020004" pitchFamily="50" charset="-127"/>
                 <a:cs typeface="Times New Roman" panose="02020603050405020304" pitchFamily="18" charset="0"/>
               </a:rPr>
-              <a:t>프로그램 코드 설명</a:t>
+              <a:t>프로그램 </a:t>
+            </a:r>
+            <a:r>
+              <a:rPr lang="en-US" altLang="ko-KR" sz="2000" b="1" kern="100" dirty="0">
+                <a:solidFill>
+                  <a:schemeClr val="bg2"/>
+                </a:solidFill>
+                <a:latin typeface="맑은 고딕" panose="020B0503020000020004" pitchFamily="50" charset="-127"/>
+                <a:ea typeface="맑은 고딕" panose="020B0503020000020004" pitchFamily="50" charset="-127"/>
+                <a:cs typeface="Times New Roman" panose="02020603050405020304" pitchFamily="18" charset="0"/>
+              </a:rPr>
+              <a:t>UI/</a:t>
+            </a:r>
+            <a:r>
+              <a:rPr lang="ko-KR" altLang="en-US" sz="2000" b="1" kern="100" dirty="0">
+                <a:solidFill>
+                  <a:schemeClr val="bg2"/>
+                </a:solidFill>
+                <a:latin typeface="맑은 고딕" panose="020B0503020000020004" pitchFamily="50" charset="-127"/>
+                <a:ea typeface="맑은 고딕" panose="020B0503020000020004" pitchFamily="50" charset="-127"/>
+                <a:cs typeface="Times New Roman" panose="02020603050405020304" pitchFamily="18" charset="0"/>
+              </a:rPr>
+              <a:t>코드 설명</a:t>
             </a:r>
             <a:endParaRPr lang="en-US" altLang="ko-KR" sz="2000" b="1" kern="100" dirty="0">
               <a:solidFill>
@@ -13797,7 +13826,7 @@
             <a:spLocks noGrp="1"/>
           </p:cNvSpPr>
           <p:nvPr>
-            <p:ph idx="1"/>
+            <p:ph sz="half" idx="1"/>
           </p:nvPr>
         </p:nvSpPr>
         <p:spPr/>
@@ -13857,22 +13886,98 @@
               </a:lnSpc>
             </a:pPr>
             <a:r>
+              <a:rPr lang="en-US" altLang="ko-KR" sz="1600" dirty="0"/>
+              <a:t>Git</a:t>
+            </a:r>
+          </a:p>
+          <a:p>
+            <a:pPr lvl="1">
+              <a:lnSpc>
+                <a:spcPct val="150000"/>
+              </a:lnSpc>
+            </a:pPr>
+            <a:endParaRPr lang="en-US" altLang="ko-KR" sz="1600" dirty="0"/>
+          </a:p>
+        </p:txBody>
+      </p:sp>
+      <p:sp>
+        <p:nvSpPr>
+          <p:cNvPr id="4" name="내용 개체 틀 3">
+            <a:extLst>
+              <a:ext uri="{FF2B5EF4-FFF2-40B4-BE49-F238E27FC236}">
+                <a16:creationId xmlns:a16="http://schemas.microsoft.com/office/drawing/2014/main" id="{7C3F6CCB-1C02-9BC4-C429-281EC28D44AF}"/>
+              </a:ext>
+            </a:extLst>
+          </p:cNvPr>
+          <p:cNvSpPr>
+            <a:spLocks noGrp="1"/>
+          </p:cNvSpPr>
+          <p:nvPr>
+            <p:ph sz="half" idx="2"/>
+          </p:nvPr>
+        </p:nvSpPr>
+        <p:spPr/>
+        <p:txBody>
+          <a:bodyPr/>
+          <a:lstStyle/>
+          <a:p>
+            <a:pPr>
+              <a:lnSpc>
+                <a:spcPct val="150000"/>
+              </a:lnSpc>
+            </a:pPr>
+            <a:r>
+              <a:rPr lang="ko-KR" altLang="en-US" sz="2000" b="1" dirty="0"/>
+              <a:t>기술</a:t>
+            </a:r>
+            <a:endParaRPr lang="en-US" altLang="ko-KR" sz="2000" b="1" dirty="0"/>
+          </a:p>
+          <a:p>
+            <a:pPr lvl="1">
+              <a:lnSpc>
+                <a:spcPct val="150000"/>
+              </a:lnSpc>
+            </a:pPr>
+            <a:r>
+              <a:rPr lang="en-US" altLang="ko-KR" sz="1600" dirty="0" err="1"/>
+              <a:t>PyMySQL</a:t>
+            </a:r>
+            <a:r>
+              <a:rPr lang="ko-KR" altLang="en-US" sz="1600" dirty="0"/>
+              <a:t> 기반 </a:t>
+            </a:r>
+            <a:r>
+              <a:rPr lang="en-US" altLang="ko-KR" sz="1600" dirty="0"/>
+              <a:t>Database </a:t>
+            </a:r>
+            <a:r>
+              <a:rPr lang="ko-KR" altLang="en-US" sz="1600" dirty="0"/>
+              <a:t>구현</a:t>
+            </a:r>
+            <a:endParaRPr lang="en-US" altLang="ko-KR" sz="1600" dirty="0"/>
+          </a:p>
+          <a:p>
+            <a:pPr lvl="1">
+              <a:lnSpc>
+                <a:spcPct val="150000"/>
+              </a:lnSpc>
+            </a:pPr>
+            <a:r>
               <a:rPr lang="en-US" altLang="ko-KR" sz="1600" dirty="0" err="1"/>
               <a:t>RestfulAPI</a:t>
             </a:r>
             <a:r>
               <a:rPr lang="en-US" altLang="ko-KR" sz="1600" dirty="0"/>
-              <a:t> (</a:t>
+              <a:t> </a:t>
             </a:r>
             <a:r>
               <a:rPr lang="ko-KR" altLang="en-US" sz="1600" dirty="0"/>
-              <a:t>추가 예정</a:t>
-            </a:r>
-            <a:r>
-              <a:rPr lang="en-US" altLang="ko-KR" sz="1600" dirty="0"/>
-              <a:t>)</a:t>
-            </a:r>
-            <a:endParaRPr lang="ko-KR" altLang="en-US" sz="1600" dirty="0"/>
+              <a:t>기반으로 구현</a:t>
+            </a:r>
+            <a:endParaRPr lang="en-US" altLang="ko-KR" sz="1600" dirty="0"/>
+          </a:p>
+          <a:p>
+            <a:endParaRPr lang="ko-KR" altLang="en-US" dirty="0"/>
           </a:p>
         </p:txBody>
       </p:sp>
@@ -14288,7 +14393,23 @@
                 <a:ea typeface="맑은 고딕" panose="020B0503020000020004" pitchFamily="50" charset="-127"/>
                 <a:cs typeface="Times New Roman" panose="02020603050405020304" pitchFamily="18" charset="0"/>
               </a:rPr>
-              <a:t>프로그램 코드 설명</a:t>
+              <a:t>프로그램 </a:t>
+            </a:r>
+            <a:r>
+              <a:rPr lang="en-US" altLang="ko-KR" sz="2000" b="1" kern="100" dirty="0">
+                <a:latin typeface="맑은 고딕" panose="020B0503020000020004" pitchFamily="50" charset="-127"/>
+                <a:ea typeface="맑은 고딕" panose="020B0503020000020004" pitchFamily="50" charset="-127"/>
+                <a:cs typeface="Times New Roman" panose="02020603050405020304" pitchFamily="18" charset="0"/>
+              </a:rPr>
+              <a:t>UI/</a:t>
+            </a:r>
+            <a:r>
+              <a:rPr lang="ko-KR" altLang="en-US" sz="2000" b="1" kern="100" dirty="0">
+                <a:latin typeface="맑은 고딕" panose="020B0503020000020004" pitchFamily="50" charset="-127"/>
+                <a:ea typeface="맑은 고딕" panose="020B0503020000020004" pitchFamily="50" charset="-127"/>
+                <a:cs typeface="Times New Roman" panose="02020603050405020304" pitchFamily="18" charset="0"/>
+              </a:rPr>
+              <a:t>코드 설명</a:t>
             </a:r>
             <a:endParaRPr lang="en-US" altLang="ko-KR" sz="2000" b="1" kern="100" dirty="0">
               <a:latin typeface="맑은 고딕" panose="020B0503020000020004" pitchFamily="50" charset="-127"/>
@@ -14358,10 +14479,10 @@
       </p:grpSpPr>
       <p:sp>
         <p:nvSpPr>
-          <p:cNvPr id="4" name="제목 3">
-            <a:extLst>
-              <a:ext uri="{FF2B5EF4-FFF2-40B4-BE49-F238E27FC236}">
-                <a16:creationId xmlns:a16="http://schemas.microsoft.com/office/drawing/2014/main" id="{3930B116-38C0-44F7-B9F4-D90C15EE77FB}"/>
+          <p:cNvPr id="2" name="제목 1">
+            <a:extLst>
+              <a:ext uri="{FF2B5EF4-FFF2-40B4-BE49-F238E27FC236}">
+                <a16:creationId xmlns:a16="http://schemas.microsoft.com/office/drawing/2014/main" id="{379168AE-7A14-F900-9E30-CCFB2E88557A}"/>
               </a:ext>
             </a:extLst>
           </p:cNvPr>
@@ -14379,28 +14500,57 @@
           </a:bodyPr>
           <a:lstStyle/>
           <a:p>
-            <a:pPr marL="342900" lvl="0" indent="-342900" algn="l" latinLnBrk="1">
+            <a:pPr>
               <a:lnSpc>
                 <a:spcPct val="100000"/>
               </a:lnSpc>
-              <a:spcAft>
-                <a:spcPts val="800"/>
-              </a:spcAft>
             </a:pPr>
             <a:r>
-              <a:rPr lang="en-US" altLang="ko-KR" b="1" dirty="0"/>
-              <a:t>Menu </a:t>
-            </a:r>
-            <a:endParaRPr lang="ko-KR" altLang="en-US" b="1" dirty="0"/>
+              <a:rPr lang="en-US" altLang="ko-KR" sz="4000" b="1" kern="100" dirty="0">
+                <a:latin typeface="맑은 고딕" panose="020B0503020000020004" pitchFamily="50" charset="-127"/>
+                <a:ea typeface="맑은 고딕" panose="020B0503020000020004" pitchFamily="50" charset="-127"/>
+                <a:cs typeface="Times New Roman" panose="02020603050405020304" pitchFamily="18" charset="0"/>
+              </a:rPr>
+              <a:t>6. </a:t>
+            </a:r>
+            <a:r>
+              <a:rPr lang="ko-KR" altLang="en-US" sz="4000" b="1" kern="100" dirty="0">
+                <a:latin typeface="맑은 고딕" panose="020B0503020000020004" pitchFamily="50" charset="-127"/>
+                <a:ea typeface="맑은 고딕" panose="020B0503020000020004" pitchFamily="50" charset="-127"/>
+                <a:cs typeface="Times New Roman" panose="02020603050405020304" pitchFamily="18" charset="0"/>
+              </a:rPr>
+              <a:t>프로그램 </a:t>
+            </a:r>
+            <a:r>
+              <a:rPr lang="en-US" altLang="ko-KR" sz="4000" b="1" kern="100" dirty="0">
+                <a:latin typeface="맑은 고딕" panose="020B0503020000020004" pitchFamily="50" charset="-127"/>
+                <a:ea typeface="맑은 고딕" panose="020B0503020000020004" pitchFamily="50" charset="-127"/>
+                <a:cs typeface="Times New Roman" panose="02020603050405020304" pitchFamily="18" charset="0"/>
+              </a:rPr>
+              <a:t>UI/</a:t>
+            </a:r>
+            <a:r>
+              <a:rPr lang="ko-KR" altLang="en-US" sz="4000" b="1" kern="100" dirty="0">
+                <a:latin typeface="맑은 고딕" panose="020B0503020000020004" pitchFamily="50" charset="-127"/>
+                <a:ea typeface="맑은 고딕" panose="020B0503020000020004" pitchFamily="50" charset="-127"/>
+                <a:cs typeface="Times New Roman" panose="02020603050405020304" pitchFamily="18" charset="0"/>
+              </a:rPr>
+              <a:t>코드 설명</a:t>
+            </a:r>
+            <a:endParaRPr lang="en-US" altLang="ko-KR" sz="4000" b="1" kern="100" dirty="0">
+              <a:latin typeface="맑은 고딕" panose="020B0503020000020004" pitchFamily="50" charset="-127"/>
+              <a:ea typeface="맑은 고딕" panose="020B0503020000020004" pitchFamily="50" charset="-127"/>
+              <a:cs typeface="Times New Roman" panose="02020603050405020304" pitchFamily="18" charset="0"/>
+            </a:endParaRPr>
           </a:p>
         </p:txBody>
       </p:sp>
       <p:sp>
         <p:nvSpPr>
-          <p:cNvPr id="6" name="내용 개체 틀 5">
-            <a:extLst>
-              <a:ext uri="{FF2B5EF4-FFF2-40B4-BE49-F238E27FC236}">
-                <a16:creationId xmlns:a16="http://schemas.microsoft.com/office/drawing/2014/main" id="{C9F3016B-562A-46AA-8C0F-636727CE06FB}"/>
+          <p:cNvPr id="3" name="내용 개체 틀 2">
+            <a:extLst>
+              <a:ext uri="{FF2B5EF4-FFF2-40B4-BE49-F238E27FC236}">
+                <a16:creationId xmlns:a16="http://schemas.microsoft.com/office/drawing/2014/main" id="{BA824B2B-9865-4105-F691-F0DC6A65534F}"/>
               </a:ext>
             </a:extLst>
           </p:cNvPr>
@@ -14418,6 +14568,245 @@
           </a:bodyPr>
           <a:lstStyle/>
           <a:p>
+            <a:pPr>
+              <a:lnSpc>
+                <a:spcPct val="150000"/>
+              </a:lnSpc>
+            </a:pPr>
+            <a:r>
+              <a:rPr lang="ko-KR" altLang="en-US" sz="2000" b="1" dirty="0"/>
+              <a:t>코드 설명</a:t>
+            </a:r>
+            <a:endParaRPr lang="ko-KR" altLang="en-US" sz="1600" dirty="0"/>
+          </a:p>
+        </p:txBody>
+      </p:sp>
+    </p:spTree>
+    <p:extLst>
+      <p:ext uri="{BB962C8B-B14F-4D97-AF65-F5344CB8AC3E}">
+        <p14:creationId xmlns:p14="http://schemas.microsoft.com/office/powerpoint/2010/main" val="2409393907"/>
+      </p:ext>
+    </p:extLst>
+  </p:cSld>
+  <p:clrMapOvr>
+    <a:masterClrMapping/>
+  </p:clrMapOvr>
+</p:sld>
+</file>
+
+<file path=ppt/slides/slide25.xml><?xml version="1.0" encoding="utf-8"?>
+<p:sld xmlns:a="http://schemas.openxmlformats.org/drawingml/2006/main" xmlns:r="http://schemas.openxmlformats.org/officeDocument/2006/relationships" xmlns:p="http://schemas.openxmlformats.org/presentationml/2006/main">
+  <p:cSld>
+    <p:spTree>
+      <p:nvGrpSpPr>
+        <p:cNvPr id="1" name=""/>
+        <p:cNvGrpSpPr/>
+        <p:nvPr/>
+      </p:nvGrpSpPr>
+      <p:grpSpPr>
+        <a:xfrm>
+          <a:off x="0" y="0"/>
+          <a:ext cx="0" cy="0"/>
+          <a:chOff x="0" y="0"/>
+          <a:chExt cx="0" cy="0"/>
+        </a:xfrm>
+      </p:grpSpPr>
+      <p:sp>
+        <p:nvSpPr>
+          <p:cNvPr id="2" name="제목 1">
+            <a:extLst>
+              <a:ext uri="{FF2B5EF4-FFF2-40B4-BE49-F238E27FC236}">
+                <a16:creationId xmlns:a16="http://schemas.microsoft.com/office/drawing/2014/main" id="{379168AE-7A14-F900-9E30-CCFB2E88557A}"/>
+              </a:ext>
+            </a:extLst>
+          </p:cNvPr>
+          <p:cNvSpPr>
+            <a:spLocks noGrp="1"/>
+          </p:cNvSpPr>
+          <p:nvPr>
+            <p:ph type="title"/>
+          </p:nvPr>
+        </p:nvSpPr>
+        <p:spPr/>
+        <p:txBody>
+          <a:bodyPr>
+            <a:normAutofit/>
+          </a:bodyPr>
+          <a:lstStyle/>
+          <a:p>
+            <a:pPr>
+              <a:lnSpc>
+                <a:spcPct val="100000"/>
+              </a:lnSpc>
+            </a:pPr>
+            <a:r>
+              <a:rPr lang="en-US" altLang="ko-KR" sz="4000" b="1" kern="100" dirty="0">
+                <a:latin typeface="맑은 고딕" panose="020B0503020000020004" pitchFamily="50" charset="-127"/>
+                <a:ea typeface="맑은 고딕" panose="020B0503020000020004" pitchFamily="50" charset="-127"/>
+                <a:cs typeface="Times New Roman" panose="02020603050405020304" pitchFamily="18" charset="0"/>
+              </a:rPr>
+              <a:t>6. </a:t>
+            </a:r>
+            <a:r>
+              <a:rPr lang="ko-KR" altLang="en-US" sz="4000" b="1" kern="100" dirty="0">
+                <a:latin typeface="맑은 고딕" panose="020B0503020000020004" pitchFamily="50" charset="-127"/>
+                <a:ea typeface="맑은 고딕" panose="020B0503020000020004" pitchFamily="50" charset="-127"/>
+                <a:cs typeface="Times New Roman" panose="02020603050405020304" pitchFamily="18" charset="0"/>
+              </a:rPr>
+              <a:t>프로그램 </a:t>
+            </a:r>
+            <a:r>
+              <a:rPr lang="en-US" altLang="ko-KR" sz="4000" b="1" kern="100" dirty="0">
+                <a:latin typeface="맑은 고딕" panose="020B0503020000020004" pitchFamily="50" charset="-127"/>
+                <a:ea typeface="맑은 고딕" panose="020B0503020000020004" pitchFamily="50" charset="-127"/>
+                <a:cs typeface="Times New Roman" panose="02020603050405020304" pitchFamily="18" charset="0"/>
+              </a:rPr>
+              <a:t>UI/</a:t>
+            </a:r>
+            <a:r>
+              <a:rPr lang="ko-KR" altLang="en-US" sz="4000" b="1" kern="100" dirty="0">
+                <a:latin typeface="맑은 고딕" panose="020B0503020000020004" pitchFamily="50" charset="-127"/>
+                <a:ea typeface="맑은 고딕" panose="020B0503020000020004" pitchFamily="50" charset="-127"/>
+                <a:cs typeface="Times New Roman" panose="02020603050405020304" pitchFamily="18" charset="0"/>
+              </a:rPr>
+              <a:t>코드 설명</a:t>
+            </a:r>
+            <a:endParaRPr lang="en-US" altLang="ko-KR" sz="4000" b="1" kern="100" dirty="0">
+              <a:latin typeface="맑은 고딕" panose="020B0503020000020004" pitchFamily="50" charset="-127"/>
+              <a:ea typeface="맑은 고딕" panose="020B0503020000020004" pitchFamily="50" charset="-127"/>
+              <a:cs typeface="Times New Roman" panose="02020603050405020304" pitchFamily="18" charset="0"/>
+            </a:endParaRPr>
+          </a:p>
+        </p:txBody>
+      </p:sp>
+      <p:sp>
+        <p:nvSpPr>
+          <p:cNvPr id="3" name="내용 개체 틀 2">
+            <a:extLst>
+              <a:ext uri="{FF2B5EF4-FFF2-40B4-BE49-F238E27FC236}">
+                <a16:creationId xmlns:a16="http://schemas.microsoft.com/office/drawing/2014/main" id="{BA824B2B-9865-4105-F691-F0DC6A65534F}"/>
+              </a:ext>
+            </a:extLst>
+          </p:cNvPr>
+          <p:cNvSpPr>
+            <a:spLocks noGrp="1"/>
+          </p:cNvSpPr>
+          <p:nvPr>
+            <p:ph idx="1"/>
+          </p:nvPr>
+        </p:nvSpPr>
+        <p:spPr/>
+        <p:txBody>
+          <a:bodyPr>
+            <a:normAutofit/>
+          </a:bodyPr>
+          <a:lstStyle/>
+          <a:p>
+            <a:pPr>
+              <a:lnSpc>
+                <a:spcPct val="150000"/>
+              </a:lnSpc>
+            </a:pPr>
+            <a:r>
+              <a:rPr lang="ko-KR" altLang="en-US" sz="2000" b="1" dirty="0"/>
+              <a:t>코드 설명</a:t>
+            </a:r>
+            <a:endParaRPr lang="ko-KR" altLang="en-US" sz="1600" dirty="0"/>
+          </a:p>
+        </p:txBody>
+      </p:sp>
+    </p:spTree>
+    <p:extLst>
+      <p:ext uri="{BB962C8B-B14F-4D97-AF65-F5344CB8AC3E}">
+        <p14:creationId xmlns:p14="http://schemas.microsoft.com/office/powerpoint/2010/main" val="1382615684"/>
+      </p:ext>
+    </p:extLst>
+  </p:cSld>
+  <p:clrMapOvr>
+    <a:masterClrMapping/>
+  </p:clrMapOvr>
+</p:sld>
+</file>
+
+<file path=ppt/slides/slide26.xml><?xml version="1.0" encoding="utf-8"?>
+<p:sld xmlns:a="http://schemas.openxmlformats.org/drawingml/2006/main" xmlns:r="http://schemas.openxmlformats.org/officeDocument/2006/relationships" xmlns:p="http://schemas.openxmlformats.org/presentationml/2006/main">
+  <p:cSld>
+    <p:spTree>
+      <p:nvGrpSpPr>
+        <p:cNvPr id="1" name=""/>
+        <p:cNvGrpSpPr/>
+        <p:nvPr/>
+      </p:nvGrpSpPr>
+      <p:grpSpPr>
+        <a:xfrm>
+          <a:off x="0" y="0"/>
+          <a:ext cx="0" cy="0"/>
+          <a:chOff x="0" y="0"/>
+          <a:chExt cx="0" cy="0"/>
+        </a:xfrm>
+      </p:grpSpPr>
+      <p:sp>
+        <p:nvSpPr>
+          <p:cNvPr id="4" name="제목 3">
+            <a:extLst>
+              <a:ext uri="{FF2B5EF4-FFF2-40B4-BE49-F238E27FC236}">
+                <a16:creationId xmlns:a16="http://schemas.microsoft.com/office/drawing/2014/main" id="{3930B116-38C0-44F7-B9F4-D90C15EE77FB}"/>
+              </a:ext>
+            </a:extLst>
+          </p:cNvPr>
+          <p:cNvSpPr>
+            <a:spLocks noGrp="1"/>
+          </p:cNvSpPr>
+          <p:nvPr>
+            <p:ph type="title"/>
+          </p:nvPr>
+        </p:nvSpPr>
+        <p:spPr/>
+        <p:txBody>
+          <a:bodyPr>
+            <a:normAutofit/>
+          </a:bodyPr>
+          <a:lstStyle/>
+          <a:p>
+            <a:pPr marL="342900" lvl="0" indent="-342900" algn="l" latinLnBrk="1">
+              <a:lnSpc>
+                <a:spcPct val="100000"/>
+              </a:lnSpc>
+              <a:spcAft>
+                <a:spcPts val="800"/>
+              </a:spcAft>
+            </a:pPr>
+            <a:r>
+              <a:rPr lang="en-US" altLang="ko-KR" b="1" dirty="0"/>
+              <a:t>Menu </a:t>
+            </a:r>
+            <a:endParaRPr lang="ko-KR" altLang="en-US" b="1" dirty="0"/>
+          </a:p>
+        </p:txBody>
+      </p:sp>
+      <p:sp>
+        <p:nvSpPr>
+          <p:cNvPr id="6" name="내용 개체 틀 5">
+            <a:extLst>
+              <a:ext uri="{FF2B5EF4-FFF2-40B4-BE49-F238E27FC236}">
+                <a16:creationId xmlns:a16="http://schemas.microsoft.com/office/drawing/2014/main" id="{C9F3016B-562A-46AA-8C0F-636727CE06FB}"/>
+              </a:ext>
+            </a:extLst>
+          </p:cNvPr>
+          <p:cNvSpPr>
+            <a:spLocks noGrp="1"/>
+          </p:cNvSpPr>
+          <p:nvPr>
+            <p:ph idx="1"/>
+          </p:nvPr>
+        </p:nvSpPr>
+        <p:spPr/>
+        <p:txBody>
+          <a:bodyPr>
+            <a:normAutofit/>
+          </a:bodyPr>
+          <a:lstStyle/>
+          <a:p>
             <a:pPr marL="514350" indent="-514350">
               <a:lnSpc>
                 <a:spcPct val="150000"/>
@@ -14741,7 +15130,29 @@
                 <a:ea typeface="맑은 고딕" panose="020B0503020000020004" pitchFamily="50" charset="-127"/>
                 <a:cs typeface="Times New Roman" panose="02020603050405020304" pitchFamily="18" charset="0"/>
               </a:rPr>
-              <a:t>프로그램 코드 설명</a:t>
+              <a:t>프로그램 </a:t>
+            </a:r>
+            <a:r>
+              <a:rPr lang="en-US" altLang="ko-KR" sz="2000" b="1" kern="100" dirty="0">
+                <a:solidFill>
+                  <a:schemeClr val="bg2"/>
+                </a:solidFill>
+                <a:latin typeface="맑은 고딕" panose="020B0503020000020004" pitchFamily="50" charset="-127"/>
+                <a:ea typeface="맑은 고딕" panose="020B0503020000020004" pitchFamily="50" charset="-127"/>
+                <a:cs typeface="Times New Roman" panose="02020603050405020304" pitchFamily="18" charset="0"/>
+              </a:rPr>
+              <a:t>UI/</a:t>
+            </a:r>
+            <a:r>
+              <a:rPr lang="ko-KR" altLang="en-US" sz="2000" b="1" kern="100" dirty="0">
+                <a:solidFill>
+                  <a:schemeClr val="bg2"/>
+                </a:solidFill>
+                <a:latin typeface="맑은 고딕" panose="020B0503020000020004" pitchFamily="50" charset="-127"/>
+                <a:ea typeface="맑은 고딕" panose="020B0503020000020004" pitchFamily="50" charset="-127"/>
+                <a:cs typeface="Times New Roman" panose="02020603050405020304" pitchFamily="18" charset="0"/>
+              </a:rPr>
+              <a:t>코드 설명</a:t>
             </a:r>
             <a:endParaRPr lang="en-US" altLang="ko-KR" sz="2000" b="1" kern="100" dirty="0">
               <a:solidFill>
@@ -14789,7 +15200,7 @@
 </p:sld>
 </file>
 
-<file path=ppt/slides/slide25.xml><?xml version="1.0" encoding="utf-8"?>
+<file path=ppt/slides/slide27.xml><?xml version="1.0" encoding="utf-8"?>
 <p:sld xmlns:a="http://schemas.openxmlformats.org/drawingml/2006/main" xmlns:r="http://schemas.openxmlformats.org/officeDocument/2006/relationships" xmlns:p="http://schemas.openxmlformats.org/presentationml/2006/main">
   <p:cSld>
     <p:spTree>
@@ -15378,7 +15789,29 @@
                 <a:ea typeface="맑은 고딕" panose="020B0503020000020004" pitchFamily="50" charset="-127"/>
                 <a:cs typeface="Times New Roman" panose="02020603050405020304" pitchFamily="18" charset="0"/>
               </a:rPr>
-              <a:t>프로그램 코드 설명</a:t>
+              <a:t>프로그램 </a:t>
+            </a:r>
+            <a:r>
+              <a:rPr lang="en-US" altLang="ko-KR" sz="2000" b="1" kern="100" dirty="0">
+                <a:solidFill>
+                  <a:schemeClr val="bg2"/>
+                </a:solidFill>
+                <a:latin typeface="맑은 고딕" panose="020B0503020000020004" pitchFamily="50" charset="-127"/>
+                <a:ea typeface="맑은 고딕" panose="020B0503020000020004" pitchFamily="50" charset="-127"/>
+                <a:cs typeface="Times New Roman" panose="02020603050405020304" pitchFamily="18" charset="0"/>
+              </a:rPr>
+              <a:t>UI/</a:t>
+            </a:r>
+            <a:r>
+              <a:rPr lang="ko-KR" altLang="en-US" sz="2000" b="1" kern="100" dirty="0">
+                <a:solidFill>
+                  <a:schemeClr val="bg2"/>
+                </a:solidFill>
+                <a:latin typeface="맑은 고딕" panose="020B0503020000020004" pitchFamily="50" charset="-127"/>
+                <a:ea typeface="맑은 고딕" panose="020B0503020000020004" pitchFamily="50" charset="-127"/>
+                <a:cs typeface="Times New Roman" panose="02020603050405020304" pitchFamily="18" charset="0"/>
+              </a:rPr>
+              <a:t>코드 설명</a:t>
             </a:r>
             <a:endParaRPr lang="en-US" altLang="ko-KR" sz="2000" b="1" kern="100" dirty="0">
               <a:solidFill>
@@ -17325,7 +17758,29 @@
                 <a:ea typeface="맑은 고딕" panose="020B0503020000020004" pitchFamily="50" charset="-127"/>
                 <a:cs typeface="Times New Roman" panose="02020603050405020304" pitchFamily="18" charset="0"/>
               </a:rPr>
-              <a:t>프로그램 코드 설명</a:t>
+              <a:t>프로그램 </a:t>
+            </a:r>
+            <a:r>
+              <a:rPr lang="en-US" altLang="ko-KR" sz="2000" b="1" kern="100" dirty="0">
+                <a:solidFill>
+                  <a:schemeClr val="bg2"/>
+                </a:solidFill>
+                <a:latin typeface="맑은 고딕" panose="020B0503020000020004" pitchFamily="50" charset="-127"/>
+                <a:ea typeface="맑은 고딕" panose="020B0503020000020004" pitchFamily="50" charset="-127"/>
+                <a:cs typeface="Times New Roman" panose="02020603050405020304" pitchFamily="18" charset="0"/>
+              </a:rPr>
+              <a:t>UI/</a:t>
+            </a:r>
+            <a:r>
+              <a:rPr lang="ko-KR" altLang="en-US" sz="2000" b="1" kern="100" dirty="0">
+                <a:solidFill>
+                  <a:schemeClr val="bg2"/>
+                </a:solidFill>
+                <a:latin typeface="맑은 고딕" panose="020B0503020000020004" pitchFamily="50" charset="-127"/>
+                <a:ea typeface="맑은 고딕" panose="020B0503020000020004" pitchFamily="50" charset="-127"/>
+                <a:cs typeface="Times New Roman" panose="02020603050405020304" pitchFamily="18" charset="0"/>
+              </a:rPr>
+              <a:t>코드 설명</a:t>
             </a:r>
             <a:endParaRPr lang="en-US" altLang="ko-KR" sz="2000" b="1" kern="100" dirty="0">
               <a:solidFill>

</xml_diff>